<commit_message>
Remove images in top left covering slide title
</commit_message>
<xml_diff>
--- a/Final OCR.pptx
+++ b/Final OCR.pptx
@@ -278,7 +278,7 @@
           <a:p>
             <a:fld id="{18E893C0-268A-43DD-B890-2066668BC0F6}" type="datetimeFigureOut">
               <a:rPr lang="en-US" smtClean="0"/>
-              <a:t>7/3/2021</a:t>
+              <a:t>7/3/21</a:t>
             </a:fld>
             <a:endParaRPr lang="en-US"/>
           </a:p>
@@ -476,7 +476,7 @@
           <a:p>
             <a:fld id="{18E893C0-268A-43DD-B890-2066668BC0F6}" type="datetimeFigureOut">
               <a:rPr lang="en-US" smtClean="0"/>
-              <a:t>7/3/2021</a:t>
+              <a:t>7/3/21</a:t>
             </a:fld>
             <a:endParaRPr lang="en-US"/>
           </a:p>
@@ -684,7 +684,7 @@
           <a:p>
             <a:fld id="{18E893C0-268A-43DD-B890-2066668BC0F6}" type="datetimeFigureOut">
               <a:rPr lang="en-US" smtClean="0"/>
-              <a:t>7/3/2021</a:t>
+              <a:t>7/3/21</a:t>
             </a:fld>
             <a:endParaRPr lang="en-US"/>
           </a:p>
@@ -882,7 +882,7 @@
           <a:p>
             <a:fld id="{18E893C0-268A-43DD-B890-2066668BC0F6}" type="datetimeFigureOut">
               <a:rPr lang="en-US" smtClean="0"/>
-              <a:t>7/3/2021</a:t>
+              <a:t>7/3/21</a:t>
             </a:fld>
             <a:endParaRPr lang="en-US"/>
           </a:p>
@@ -1157,7 +1157,7 @@
           <a:p>
             <a:fld id="{18E893C0-268A-43DD-B890-2066668BC0F6}" type="datetimeFigureOut">
               <a:rPr lang="en-US" smtClean="0"/>
-              <a:t>7/3/2021</a:t>
+              <a:t>7/3/21</a:t>
             </a:fld>
             <a:endParaRPr lang="en-US"/>
           </a:p>
@@ -1422,7 +1422,7 @@
           <a:p>
             <a:fld id="{18E893C0-268A-43DD-B890-2066668BC0F6}" type="datetimeFigureOut">
               <a:rPr lang="en-US" smtClean="0"/>
-              <a:t>7/3/2021</a:t>
+              <a:t>7/3/21</a:t>
             </a:fld>
             <a:endParaRPr lang="en-US"/>
           </a:p>
@@ -1834,7 +1834,7 @@
           <a:p>
             <a:fld id="{18E893C0-268A-43DD-B890-2066668BC0F6}" type="datetimeFigureOut">
               <a:rPr lang="en-US" smtClean="0"/>
-              <a:t>7/3/2021</a:t>
+              <a:t>7/3/21</a:t>
             </a:fld>
             <a:endParaRPr lang="en-US"/>
           </a:p>
@@ -1975,7 +1975,7 @@
           <a:p>
             <a:fld id="{18E893C0-268A-43DD-B890-2066668BC0F6}" type="datetimeFigureOut">
               <a:rPr lang="en-US" smtClean="0"/>
-              <a:t>7/3/2021</a:t>
+              <a:t>7/3/21</a:t>
             </a:fld>
             <a:endParaRPr lang="en-US"/>
           </a:p>
@@ -2088,7 +2088,7 @@
           <a:p>
             <a:fld id="{18E893C0-268A-43DD-B890-2066668BC0F6}" type="datetimeFigureOut">
               <a:rPr lang="en-US" smtClean="0"/>
-              <a:t>7/3/2021</a:t>
+              <a:t>7/3/21</a:t>
             </a:fld>
             <a:endParaRPr lang="en-US"/>
           </a:p>
@@ -2399,7 +2399,7 @@
           <a:p>
             <a:fld id="{18E893C0-268A-43DD-B890-2066668BC0F6}" type="datetimeFigureOut">
               <a:rPr lang="en-US" smtClean="0"/>
-              <a:t>7/3/2021</a:t>
+              <a:t>7/3/21</a:t>
             </a:fld>
             <a:endParaRPr lang="en-US"/>
           </a:p>
@@ -2687,7 +2687,7 @@
           <a:p>
             <a:fld id="{18E893C0-268A-43DD-B890-2066668BC0F6}" type="datetimeFigureOut">
               <a:rPr lang="en-US" smtClean="0"/>
-              <a:t>7/3/2021</a:t>
+              <a:t>7/3/21</a:t>
             </a:fld>
             <a:endParaRPr lang="en-US"/>
           </a:p>
@@ -2928,7 +2928,7 @@
           <a:p>
             <a:fld id="{18E893C0-268A-43DD-B890-2066668BC0F6}" type="datetimeFigureOut">
               <a:rPr lang="en-US" smtClean="0"/>
-              <a:t>7/3/2021</a:t>
+              <a:t>7/3/21</a:t>
             </a:fld>
             <a:endParaRPr lang="en-US"/>
           </a:p>
@@ -6062,7 +6062,7 @@
           <p:nvPr/>
         </p:nvPicPr>
         <p:blipFill>
-          <a:blip r:embed="rId3"/>
+          <a:blip r:embed="rId2"/>
           <a:stretch>
             <a:fillRect/>
           </a:stretch>

</xml_diff>